<commit_message>
upd 2nd dijkstra slide
</commit_message>
<xml_diff>
--- a/ipython_nbs/search/images/dijkstra-algorithm/dijkstra.pptx
+++ b/ipython_nbs/search/images/dijkstra-algorithm/dijkstra.pptx
@@ -5356,31 +5356,7 @@
             </a:pPr>
             <a:r>
               <a:rPr lang="en-US" dirty="0" smtClean="0"/>
-              <a:t>Compute cost of all the neighbors of the starting note (here: A). For instance, the cost of reaching B, C, and D from node A </a:t>
-            </a:r>
-            <a:r>
-              <a:rPr lang="en-US" smtClean="0"/>
-              <a:t>is </a:t>
-            </a:r>
-            <a:r>
-              <a:rPr lang="en-US" smtClean="0"/>
-              <a:t>14, </a:t>
-            </a:r>
-            <a:r>
-              <a:rPr lang="en-US" dirty="0" smtClean="0"/>
-              <a:t>9, </a:t>
-            </a:r>
-            <a:r>
-              <a:rPr lang="en-US" smtClean="0"/>
-              <a:t>and </a:t>
-            </a:r>
-            <a:r>
-              <a:rPr lang="en-US" smtClean="0"/>
-              <a:t>7, </a:t>
-            </a:r>
-            <a:r>
-              <a:rPr lang="en-US" dirty="0" smtClean="0"/>
-              <a:t>respectively.</a:t>
+              <a:t>Compute cost of all the neighbors of the starting note (here: A). For instance, the cost of reaching B, C, and D from node A is 14, 9, and 7, respectively.</a:t>
             </a:r>
             <a:endParaRPr lang="en-US" dirty="0"/>
           </a:p>
@@ -5397,7 +5373,23 @@
             </a:pPr>
             <a:r>
               <a:rPr lang="en-US" dirty="0" smtClean="0"/>
-              <a:t>Assign cost “infinity” to all remaining nodes in the graph -- that is, all nodes that are not direct neighbors of the starting node A (here: D and F).</a:t>
+              <a:t>Assign cost “infinity” to all remaining nodes in the graph -- that is, all nodes that are not direct neighbors of the starting node A (here</a:t>
+            </a:r>
+            <a:r>
+              <a:rPr lang="en-US" smtClean="0"/>
+              <a:t>: </a:t>
+            </a:r>
+            <a:r>
+              <a:rPr lang="en-US"/>
+              <a:t>E</a:t>
+            </a:r>
+            <a:r>
+              <a:rPr lang="en-US" smtClean="0"/>
+              <a:t> </a:t>
+            </a:r>
+            <a:r>
+              <a:rPr lang="en-US" dirty="0" smtClean="0"/>
+              <a:t>and F).</a:t>
             </a:r>
             <a:endParaRPr lang="en-US" dirty="0"/>
           </a:p>

</xml_diff>